<commit_message>
more changes to Parameter Table and figures for paper
</commit_message>
<xml_diff>
--- a/schematics.pptx
+++ b/schematics.pptx
@@ -6,7 +6,8 @@
   </p:sldMasterIdLst>
   <p:sldIdLst>
     <p:sldId id="256" r:id="rId2"/>
-    <p:sldId id="257" r:id="rId3"/>
+    <p:sldId id="258" r:id="rId3"/>
+    <p:sldId id="257" r:id="rId4"/>
   </p:sldIdLst>
   <p:sldSz cx="9144000" cy="6858000" type="screen4x3"/>
   <p:notesSz cx="6858000" cy="9144000"/>
@@ -289,7 +290,7 @@
           <a:p>
             <a:fld id="{98227C96-088E-4998-9939-39E955B626A6}" type="datetimeFigureOut">
               <a:rPr lang="en-US" smtClean="0"/>
-              <a:t>1/28/2015</a:t>
+              <a:t>1/29/2015</a:t>
             </a:fld>
             <a:endParaRPr lang="en-US"/>
           </a:p>
@@ -459,7 +460,7 @@
           <a:p>
             <a:fld id="{98227C96-088E-4998-9939-39E955B626A6}" type="datetimeFigureOut">
               <a:rPr lang="en-US" smtClean="0"/>
-              <a:t>1/28/2015</a:t>
+              <a:t>1/29/2015</a:t>
             </a:fld>
             <a:endParaRPr lang="en-US"/>
           </a:p>
@@ -639,7 +640,7 @@
           <a:p>
             <a:fld id="{98227C96-088E-4998-9939-39E955B626A6}" type="datetimeFigureOut">
               <a:rPr lang="en-US" smtClean="0"/>
-              <a:t>1/28/2015</a:t>
+              <a:t>1/29/2015</a:t>
             </a:fld>
             <a:endParaRPr lang="en-US"/>
           </a:p>
@@ -809,7 +810,7 @@
           <a:p>
             <a:fld id="{98227C96-088E-4998-9939-39E955B626A6}" type="datetimeFigureOut">
               <a:rPr lang="en-US" smtClean="0"/>
-              <a:t>1/28/2015</a:t>
+              <a:t>1/29/2015</a:t>
             </a:fld>
             <a:endParaRPr lang="en-US"/>
           </a:p>
@@ -1055,7 +1056,7 @@
           <a:p>
             <a:fld id="{98227C96-088E-4998-9939-39E955B626A6}" type="datetimeFigureOut">
               <a:rPr lang="en-US" smtClean="0"/>
-              <a:t>1/28/2015</a:t>
+              <a:t>1/29/2015</a:t>
             </a:fld>
             <a:endParaRPr lang="en-US"/>
           </a:p>
@@ -1343,7 +1344,7 @@
           <a:p>
             <a:fld id="{98227C96-088E-4998-9939-39E955B626A6}" type="datetimeFigureOut">
               <a:rPr lang="en-US" smtClean="0"/>
-              <a:t>1/28/2015</a:t>
+              <a:t>1/29/2015</a:t>
             </a:fld>
             <a:endParaRPr lang="en-US"/>
           </a:p>
@@ -1765,7 +1766,7 @@
           <a:p>
             <a:fld id="{98227C96-088E-4998-9939-39E955B626A6}" type="datetimeFigureOut">
               <a:rPr lang="en-US" smtClean="0"/>
-              <a:t>1/28/2015</a:t>
+              <a:t>1/29/2015</a:t>
             </a:fld>
             <a:endParaRPr lang="en-US"/>
           </a:p>
@@ -1883,7 +1884,7 @@
           <a:p>
             <a:fld id="{98227C96-088E-4998-9939-39E955B626A6}" type="datetimeFigureOut">
               <a:rPr lang="en-US" smtClean="0"/>
-              <a:t>1/28/2015</a:t>
+              <a:t>1/29/2015</a:t>
             </a:fld>
             <a:endParaRPr lang="en-US"/>
           </a:p>
@@ -1978,7 +1979,7 @@
           <a:p>
             <a:fld id="{98227C96-088E-4998-9939-39E955B626A6}" type="datetimeFigureOut">
               <a:rPr lang="en-US" smtClean="0"/>
-              <a:t>1/28/2015</a:t>
+              <a:t>1/29/2015</a:t>
             </a:fld>
             <a:endParaRPr lang="en-US"/>
           </a:p>
@@ -2255,7 +2256,7 @@
           <a:p>
             <a:fld id="{98227C96-088E-4998-9939-39E955B626A6}" type="datetimeFigureOut">
               <a:rPr lang="en-US" smtClean="0"/>
-              <a:t>1/28/2015</a:t>
+              <a:t>1/29/2015</a:t>
             </a:fld>
             <a:endParaRPr lang="en-US"/>
           </a:p>
@@ -2508,7 +2509,7 @@
           <a:p>
             <a:fld id="{98227C96-088E-4998-9939-39E955B626A6}" type="datetimeFigureOut">
               <a:rPr lang="en-US" smtClean="0"/>
-              <a:t>1/28/2015</a:t>
+              <a:t>1/29/2015</a:t>
             </a:fld>
             <a:endParaRPr lang="en-US"/>
           </a:p>
@@ -2721,7 +2722,7 @@
           <a:p>
             <a:fld id="{98227C96-088E-4998-9939-39E955B626A6}" type="datetimeFigureOut">
               <a:rPr lang="en-US" smtClean="0"/>
-              <a:t>1/28/2015</a:t>
+              <a:t>1/29/2015</a:t>
             </a:fld>
             <a:endParaRPr lang="en-US"/>
           </a:p>
@@ -3203,7 +3204,9 @@
             <a:avLst/>
           </a:prstGeom>
           <a:solidFill>
-            <a:schemeClr val="bg1"/>
+            <a:schemeClr val="bg1">
+              <a:lumMod val="75000"/>
+            </a:schemeClr>
           </a:solidFill>
           <a:ln>
             <a:solidFill>
@@ -3700,6 +3703,739 @@
 </file>
 
 <file path=ppt/slides/slide2.xml><?xml version="1.0" encoding="utf-8"?>
+<p:sld xmlns:a="http://schemas.openxmlformats.org/drawingml/2006/main" xmlns:r="http://schemas.openxmlformats.org/officeDocument/2006/relationships" xmlns:p="http://schemas.openxmlformats.org/presentationml/2006/main">
+  <p:cSld>
+    <p:spTree>
+      <p:nvGrpSpPr>
+        <p:cNvPr id="1" name=""/>
+        <p:cNvGrpSpPr/>
+        <p:nvPr/>
+      </p:nvGrpSpPr>
+      <p:grpSpPr>
+        <a:xfrm>
+          <a:off x="0" y="0"/>
+          <a:ext cx="0" cy="0"/>
+          <a:chOff x="0" y="0"/>
+          <a:chExt cx="0" cy="0"/>
+        </a:xfrm>
+      </p:grpSpPr>
+      <p:sp>
+        <p:nvSpPr>
+          <p:cNvPr id="5" name="TextBox 4"/>
+          <p:cNvSpPr txBox="1"/>
+          <p:nvPr/>
+        </p:nvSpPr>
+        <p:spPr>
+          <a:xfrm>
+            <a:off x="1524000" y="2297668"/>
+            <a:ext cx="2362200" cy="369271"/>
+          </a:xfrm>
+          <a:prstGeom prst="rect">
+            <a:avLst/>
+          </a:prstGeom>
+          <a:solidFill>
+            <a:schemeClr val="bg1">
+              <a:lumMod val="75000"/>
+            </a:schemeClr>
+          </a:solidFill>
+          <a:ln>
+            <a:solidFill>
+              <a:schemeClr val="tx1"/>
+            </a:solidFill>
+          </a:ln>
+        </p:spPr>
+        <p:txBody>
+          <a:bodyPr wrap="square" lIns="91382" tIns="45690" rIns="91382" bIns="45690" rtlCol="0">
+            <a:spAutoFit/>
+          </a:bodyPr>
+          <a:lstStyle/>
+          <a:p>
+            <a:pPr algn="ctr"/>
+            <a:r>
+              <a:rPr lang="en-US" b="1" dirty="0" smtClean="0">
+                <a:latin typeface="Arial" panose="020B0604020202020204" pitchFamily="34" charset="0"/>
+                <a:cs typeface="Arial" panose="020B0604020202020204" pitchFamily="34" charset="0"/>
+              </a:rPr>
+              <a:t>Floating </a:t>
+            </a:r>
+            <a:r>
+              <a:rPr lang="en-US" b="1" dirty="0" smtClean="0">
+                <a:latin typeface="Arial" panose="020B0604020202020204" pitchFamily="34" charset="0"/>
+                <a:cs typeface="Arial" panose="020B0604020202020204" pitchFamily="34" charset="0"/>
+              </a:rPr>
+              <a:t>plants</a:t>
+            </a:r>
+            <a:endParaRPr lang="en-US" b="1" dirty="0">
+              <a:latin typeface="Arial" panose="020B0604020202020204" pitchFamily="34" charset="0"/>
+              <a:cs typeface="Arial" panose="020B0604020202020204" pitchFamily="34" charset="0"/>
+            </a:endParaRPr>
+          </a:p>
+        </p:txBody>
+      </p:sp>
+      <p:sp>
+        <p:nvSpPr>
+          <p:cNvPr id="6" name="TextBox 5"/>
+          <p:cNvSpPr txBox="1"/>
+          <p:nvPr/>
+        </p:nvSpPr>
+        <p:spPr>
+          <a:xfrm>
+            <a:off x="5105400" y="2297668"/>
+            <a:ext cx="2514600" cy="369271"/>
+          </a:xfrm>
+          <a:prstGeom prst="rect">
+            <a:avLst/>
+          </a:prstGeom>
+          <a:solidFill>
+            <a:schemeClr val="bg1">
+              <a:lumMod val="75000"/>
+            </a:schemeClr>
+          </a:solidFill>
+          <a:ln>
+            <a:solidFill>
+              <a:schemeClr val="tx1"/>
+            </a:solidFill>
+          </a:ln>
+        </p:spPr>
+        <p:txBody>
+          <a:bodyPr wrap="square" lIns="91382" tIns="45690" rIns="91382" bIns="45690" rtlCol="0">
+            <a:spAutoFit/>
+          </a:bodyPr>
+          <a:lstStyle/>
+          <a:p>
+            <a:pPr algn="ctr"/>
+            <a:r>
+              <a:rPr lang="en-US" b="1" dirty="0" smtClean="0">
+                <a:latin typeface="Arial" panose="020B0604020202020204" pitchFamily="34" charset="0"/>
+                <a:cs typeface="Arial" panose="020B0604020202020204" pitchFamily="34" charset="0"/>
+              </a:rPr>
+              <a:t>Submerged </a:t>
+            </a:r>
+            <a:r>
+              <a:rPr lang="en-US" b="1" dirty="0" smtClean="0">
+                <a:latin typeface="Arial" panose="020B0604020202020204" pitchFamily="34" charset="0"/>
+                <a:cs typeface="Arial" panose="020B0604020202020204" pitchFamily="34" charset="0"/>
+              </a:rPr>
+              <a:t>plants</a:t>
+            </a:r>
+            <a:endParaRPr lang="en-US" b="1" dirty="0">
+              <a:latin typeface="Arial" panose="020B0604020202020204" pitchFamily="34" charset="0"/>
+              <a:cs typeface="Arial" panose="020B0604020202020204" pitchFamily="34" charset="0"/>
+            </a:endParaRPr>
+          </a:p>
+        </p:txBody>
+      </p:sp>
+      <p:sp>
+        <p:nvSpPr>
+          <p:cNvPr id="7" name="TextBox 6"/>
+          <p:cNvSpPr txBox="1"/>
+          <p:nvPr/>
+        </p:nvSpPr>
+        <p:spPr>
+          <a:xfrm>
+            <a:off x="3200400" y="3541693"/>
+            <a:ext cx="2743200" cy="369271"/>
+          </a:xfrm>
+          <a:prstGeom prst="rect">
+            <a:avLst/>
+          </a:prstGeom>
+          <a:solidFill>
+            <a:schemeClr val="bg1">
+              <a:lumMod val="75000"/>
+            </a:schemeClr>
+          </a:solidFill>
+          <a:ln>
+            <a:solidFill>
+              <a:schemeClr val="tx1"/>
+            </a:solidFill>
+          </a:ln>
+        </p:spPr>
+        <p:txBody>
+          <a:bodyPr wrap="square" lIns="91382" tIns="45690" rIns="91382" bIns="45690" rtlCol="0">
+            <a:spAutoFit/>
+          </a:bodyPr>
+          <a:lstStyle/>
+          <a:p>
+            <a:pPr algn="ctr"/>
+            <a:r>
+              <a:rPr lang="en-US" b="1" dirty="0" smtClean="0">
+                <a:latin typeface="Arial" panose="020B0604020202020204" pitchFamily="34" charset="0"/>
+                <a:cs typeface="Arial" panose="020B0604020202020204" pitchFamily="34" charset="0"/>
+              </a:rPr>
+              <a:t>Total </a:t>
+            </a:r>
+            <a:r>
+              <a:rPr lang="en-US" b="1" dirty="0" smtClean="0">
+                <a:latin typeface="Arial" panose="020B0604020202020204" pitchFamily="34" charset="0"/>
+                <a:cs typeface="Arial" panose="020B0604020202020204" pitchFamily="34" charset="0"/>
+              </a:rPr>
+              <a:t>nitrogen, current</a:t>
+            </a:r>
+            <a:endParaRPr lang="en-US" b="1" dirty="0">
+              <a:latin typeface="Arial" panose="020B0604020202020204" pitchFamily="34" charset="0"/>
+              <a:cs typeface="Arial" panose="020B0604020202020204" pitchFamily="34" charset="0"/>
+            </a:endParaRPr>
+          </a:p>
+        </p:txBody>
+      </p:sp>
+      <p:sp>
+        <p:nvSpPr>
+          <p:cNvPr id="8" name="TextBox 7"/>
+          <p:cNvSpPr txBox="1"/>
+          <p:nvPr/>
+        </p:nvSpPr>
+        <p:spPr>
+          <a:xfrm>
+            <a:off x="1447800" y="3547216"/>
+            <a:ext cx="1295400" cy="369271"/>
+          </a:xfrm>
+          <a:prstGeom prst="rect">
+            <a:avLst/>
+          </a:prstGeom>
+          <a:solidFill>
+            <a:schemeClr val="bg1"/>
+          </a:solidFill>
+          <a:ln>
+            <a:solidFill>
+              <a:schemeClr val="tx1"/>
+            </a:solidFill>
+          </a:ln>
+        </p:spPr>
+        <p:txBody>
+          <a:bodyPr wrap="square" lIns="91382" tIns="45690" rIns="91382" bIns="45690" rtlCol="0" anchor="ctr">
+            <a:spAutoFit/>
+          </a:bodyPr>
+          <a:lstStyle/>
+          <a:p>
+            <a:pPr algn="ctr"/>
+            <a:r>
+              <a:rPr lang="en-US" b="1" dirty="0" smtClean="0">
+                <a:latin typeface="Arial" panose="020B0604020202020204" pitchFamily="34" charset="0"/>
+                <a:cs typeface="Arial" panose="020B0604020202020204" pitchFamily="34" charset="0"/>
+              </a:rPr>
+              <a:t>Wind</a:t>
+            </a:r>
+          </a:p>
+        </p:txBody>
+      </p:sp>
+      <p:cxnSp>
+        <p:nvCxnSpPr>
+          <p:cNvPr id="11" name="Straight Arrow Connector 10"/>
+          <p:cNvCxnSpPr/>
+          <p:nvPr/>
+        </p:nvCxnSpPr>
+        <p:spPr>
+          <a:xfrm>
+            <a:off x="3476436" y="2667000"/>
+            <a:ext cx="0" cy="874692"/>
+          </a:xfrm>
+          <a:prstGeom prst="straightConnector1">
+            <a:avLst/>
+          </a:prstGeom>
+          <a:ln w="25400">
+            <a:solidFill>
+              <a:schemeClr val="tx1"/>
+            </a:solidFill>
+            <a:tailEnd type="triangle" w="med" len="lg"/>
+          </a:ln>
+        </p:spPr>
+        <p:style>
+          <a:lnRef idx="1">
+            <a:schemeClr val="accent1"/>
+          </a:lnRef>
+          <a:fillRef idx="0">
+            <a:schemeClr val="accent1"/>
+          </a:fillRef>
+          <a:effectRef idx="0">
+            <a:schemeClr val="accent1"/>
+          </a:effectRef>
+          <a:fontRef idx="minor">
+            <a:schemeClr val="tx1"/>
+          </a:fontRef>
+        </p:style>
+      </p:cxnSp>
+      <p:cxnSp>
+        <p:nvCxnSpPr>
+          <p:cNvPr id="12" name="Straight Arrow Connector 11"/>
+          <p:cNvCxnSpPr/>
+          <p:nvPr/>
+        </p:nvCxnSpPr>
+        <p:spPr>
+          <a:xfrm>
+            <a:off x="3691784" y="2543215"/>
+            <a:ext cx="0" cy="860147"/>
+          </a:xfrm>
+          <a:prstGeom prst="straightConnector1">
+            <a:avLst/>
+          </a:prstGeom>
+          <a:ln w="25400">
+            <a:solidFill>
+              <a:schemeClr val="tx1"/>
+            </a:solidFill>
+            <a:tailEnd type="triangle" w="med" len="lg"/>
+          </a:ln>
+          <a:scene3d>
+            <a:camera prst="orthographicFront">
+              <a:rot lat="0" lon="0" rev="10800000"/>
+            </a:camera>
+            <a:lightRig rig="threePt" dir="t"/>
+          </a:scene3d>
+        </p:spPr>
+        <p:style>
+          <a:lnRef idx="1">
+            <a:schemeClr val="accent1"/>
+          </a:lnRef>
+          <a:fillRef idx="0">
+            <a:schemeClr val="accent1"/>
+          </a:fillRef>
+          <a:effectRef idx="0">
+            <a:schemeClr val="accent1"/>
+          </a:effectRef>
+          <a:fontRef idx="minor">
+            <a:schemeClr val="tx1"/>
+          </a:fontRef>
+        </p:style>
+      </p:cxnSp>
+      <p:cxnSp>
+        <p:nvCxnSpPr>
+          <p:cNvPr id="25" name="Straight Arrow Connector 24"/>
+          <p:cNvCxnSpPr>
+            <a:stCxn id="8" idx="0"/>
+          </p:cNvCxnSpPr>
+          <p:nvPr/>
+        </p:nvCxnSpPr>
+        <p:spPr>
+          <a:xfrm flipV="1">
+            <a:off x="2095500" y="2672569"/>
+            <a:ext cx="0" cy="874647"/>
+          </a:xfrm>
+          <a:prstGeom prst="straightConnector1">
+            <a:avLst/>
+          </a:prstGeom>
+          <a:ln w="25400">
+            <a:solidFill>
+              <a:schemeClr val="tx1"/>
+            </a:solidFill>
+            <a:tailEnd type="triangle" w="med" len="lg"/>
+          </a:ln>
+        </p:spPr>
+        <p:style>
+          <a:lnRef idx="1">
+            <a:schemeClr val="accent1"/>
+          </a:lnRef>
+          <a:fillRef idx="0">
+            <a:schemeClr val="accent1"/>
+          </a:fillRef>
+          <a:effectRef idx="0">
+            <a:schemeClr val="accent1"/>
+          </a:effectRef>
+          <a:fontRef idx="minor">
+            <a:schemeClr val="tx1"/>
+          </a:fontRef>
+        </p:style>
+      </p:cxnSp>
+      <p:cxnSp>
+        <p:nvCxnSpPr>
+          <p:cNvPr id="13" name="Straight Arrow Connector 12"/>
+          <p:cNvCxnSpPr/>
+          <p:nvPr/>
+        </p:nvCxnSpPr>
+        <p:spPr>
+          <a:xfrm>
+            <a:off x="3903292" y="2506768"/>
+            <a:ext cx="1202108" cy="0"/>
+          </a:xfrm>
+          <a:prstGeom prst="straightConnector1">
+            <a:avLst/>
+          </a:prstGeom>
+          <a:ln w="25400">
+            <a:solidFill>
+              <a:schemeClr val="tx1"/>
+            </a:solidFill>
+            <a:tailEnd type="triangle" w="med" len="lg"/>
+          </a:ln>
+        </p:spPr>
+        <p:style>
+          <a:lnRef idx="1">
+            <a:schemeClr val="accent1"/>
+          </a:lnRef>
+          <a:fillRef idx="0">
+            <a:schemeClr val="accent1"/>
+          </a:fillRef>
+          <a:effectRef idx="0">
+            <a:schemeClr val="accent1"/>
+          </a:effectRef>
+          <a:fontRef idx="minor">
+            <a:schemeClr val="tx1"/>
+          </a:fontRef>
+        </p:style>
+      </p:cxnSp>
+      <p:sp>
+        <p:nvSpPr>
+          <p:cNvPr id="10" name="TextBox 9"/>
+          <p:cNvSpPr txBox="1"/>
+          <p:nvPr/>
+        </p:nvSpPr>
+        <p:spPr>
+          <a:xfrm>
+            <a:off x="3969026" y="2235438"/>
+            <a:ext cx="924866" cy="307777"/>
+          </a:xfrm>
+          <a:prstGeom prst="rect">
+            <a:avLst/>
+          </a:prstGeom>
+          <a:noFill/>
+        </p:spPr>
+        <p:txBody>
+          <a:bodyPr wrap="square" rtlCol="0">
+            <a:spAutoFit/>
+          </a:bodyPr>
+          <a:lstStyle/>
+          <a:p>
+            <a:pPr algn="ctr"/>
+            <a:r>
+              <a:rPr lang="en-US" sz="1400" i="1" dirty="0" smtClean="0"/>
+              <a:t>shading</a:t>
+            </a:r>
+            <a:endParaRPr lang="en-US" sz="1400" i="1" dirty="0"/>
+          </a:p>
+        </p:txBody>
+      </p:sp>
+      <p:cxnSp>
+        <p:nvCxnSpPr>
+          <p:cNvPr id="15" name="Elbow Connector 14"/>
+          <p:cNvCxnSpPr>
+            <a:stCxn id="6" idx="0"/>
+            <a:endCxn id="6" idx="3"/>
+          </p:cNvCxnSpPr>
+          <p:nvPr/>
+        </p:nvCxnSpPr>
+        <p:spPr>
+          <a:xfrm rot="16200000" flipH="1">
+            <a:off x="6899032" y="1761336"/>
+            <a:ext cx="184636" cy="1257300"/>
+          </a:xfrm>
+          <a:prstGeom prst="bentConnector4">
+            <a:avLst>
+              <a:gd name="adj1" fmla="val -296070"/>
+              <a:gd name="adj2" fmla="val 118182"/>
+            </a:avLst>
+          </a:prstGeom>
+          <a:ln w="25400">
+            <a:solidFill>
+              <a:schemeClr val="tx1"/>
+            </a:solidFill>
+            <a:tailEnd type="triangle" w="med" len="lg"/>
+          </a:ln>
+        </p:spPr>
+        <p:style>
+          <a:lnRef idx="1">
+            <a:schemeClr val="accent1"/>
+          </a:lnRef>
+          <a:fillRef idx="0">
+            <a:schemeClr val="accent1"/>
+          </a:fillRef>
+          <a:effectRef idx="0">
+            <a:schemeClr val="accent1"/>
+          </a:effectRef>
+          <a:fontRef idx="minor">
+            <a:schemeClr val="tx1"/>
+          </a:fontRef>
+        </p:style>
+      </p:cxnSp>
+      <p:sp>
+        <p:nvSpPr>
+          <p:cNvPr id="34" name="TextBox 33"/>
+          <p:cNvSpPr txBox="1"/>
+          <p:nvPr/>
+        </p:nvSpPr>
+        <p:spPr>
+          <a:xfrm>
+            <a:off x="6629400" y="1448514"/>
+            <a:ext cx="924866" cy="307777"/>
+          </a:xfrm>
+          <a:prstGeom prst="rect">
+            <a:avLst/>
+          </a:prstGeom>
+          <a:noFill/>
+        </p:spPr>
+        <p:txBody>
+          <a:bodyPr wrap="square" rtlCol="0">
+            <a:spAutoFit/>
+          </a:bodyPr>
+          <a:lstStyle/>
+          <a:p>
+            <a:pPr algn="ctr"/>
+            <a:r>
+              <a:rPr lang="en-US" sz="1400" i="1" dirty="0" smtClean="0"/>
+              <a:t>shading</a:t>
+            </a:r>
+            <a:endParaRPr lang="en-US" sz="1400" i="1" dirty="0"/>
+          </a:p>
+        </p:txBody>
+      </p:sp>
+      <p:cxnSp>
+        <p:nvCxnSpPr>
+          <p:cNvPr id="35" name="Elbow Connector 34"/>
+          <p:cNvCxnSpPr>
+            <a:stCxn id="5" idx="0"/>
+            <a:endCxn id="5" idx="1"/>
+          </p:cNvCxnSpPr>
+          <p:nvPr/>
+        </p:nvCxnSpPr>
+        <p:spPr>
+          <a:xfrm rot="16200000" flipH="1" flipV="1">
+            <a:off x="2022232" y="1799436"/>
+            <a:ext cx="184636" cy="1181100"/>
+          </a:xfrm>
+          <a:prstGeom prst="bentConnector4">
+            <a:avLst>
+              <a:gd name="adj1" fmla="val -308950"/>
+              <a:gd name="adj2" fmla="val 119355"/>
+            </a:avLst>
+          </a:prstGeom>
+          <a:ln w="25400">
+            <a:solidFill>
+              <a:schemeClr val="tx1"/>
+            </a:solidFill>
+            <a:tailEnd type="triangle" w="med" len="lg"/>
+          </a:ln>
+        </p:spPr>
+        <p:style>
+          <a:lnRef idx="1">
+            <a:schemeClr val="accent1"/>
+          </a:lnRef>
+          <a:fillRef idx="0">
+            <a:schemeClr val="accent1"/>
+          </a:fillRef>
+          <a:effectRef idx="0">
+            <a:schemeClr val="accent1"/>
+          </a:effectRef>
+          <a:fontRef idx="minor">
+            <a:schemeClr val="tx1"/>
+          </a:fontRef>
+        </p:style>
+      </p:cxnSp>
+      <p:sp>
+        <p:nvSpPr>
+          <p:cNvPr id="39" name="TextBox 38"/>
+          <p:cNvSpPr txBox="1"/>
+          <p:nvPr/>
+        </p:nvSpPr>
+        <p:spPr>
+          <a:xfrm>
+            <a:off x="1504988" y="1457060"/>
+            <a:ext cx="924866" cy="307777"/>
+          </a:xfrm>
+          <a:prstGeom prst="rect">
+            <a:avLst/>
+          </a:prstGeom>
+          <a:noFill/>
+        </p:spPr>
+        <p:txBody>
+          <a:bodyPr wrap="square" rtlCol="0">
+            <a:spAutoFit/>
+          </a:bodyPr>
+          <a:lstStyle/>
+          <a:p>
+            <a:pPr algn="ctr"/>
+            <a:r>
+              <a:rPr lang="en-US" sz="1400" i="1" dirty="0" smtClean="0"/>
+              <a:t>shading</a:t>
+            </a:r>
+            <a:endParaRPr lang="en-US" sz="1400" i="1" dirty="0"/>
+          </a:p>
+        </p:txBody>
+      </p:sp>
+      <p:cxnSp>
+        <p:nvCxnSpPr>
+          <p:cNvPr id="45" name="Straight Arrow Connector 44"/>
+          <p:cNvCxnSpPr/>
+          <p:nvPr/>
+        </p:nvCxnSpPr>
+        <p:spPr>
+          <a:xfrm>
+            <a:off x="5342546" y="2672569"/>
+            <a:ext cx="0" cy="874692"/>
+          </a:xfrm>
+          <a:prstGeom prst="straightConnector1">
+            <a:avLst/>
+          </a:prstGeom>
+          <a:ln w="25400">
+            <a:solidFill>
+              <a:schemeClr val="tx1"/>
+            </a:solidFill>
+            <a:tailEnd type="triangle" w="med" len="lg"/>
+          </a:ln>
+        </p:spPr>
+        <p:style>
+          <a:lnRef idx="1">
+            <a:schemeClr val="accent1"/>
+          </a:lnRef>
+          <a:fillRef idx="0">
+            <a:schemeClr val="accent1"/>
+          </a:fillRef>
+          <a:effectRef idx="0">
+            <a:schemeClr val="accent1"/>
+          </a:effectRef>
+          <a:fontRef idx="minor">
+            <a:schemeClr val="tx1"/>
+          </a:fontRef>
+        </p:style>
+      </p:cxnSp>
+      <p:cxnSp>
+        <p:nvCxnSpPr>
+          <p:cNvPr id="46" name="Straight Arrow Connector 45"/>
+          <p:cNvCxnSpPr/>
+          <p:nvPr/>
+        </p:nvCxnSpPr>
+        <p:spPr>
+          <a:xfrm>
+            <a:off x="5557894" y="2548784"/>
+            <a:ext cx="0" cy="860147"/>
+          </a:xfrm>
+          <a:prstGeom prst="straightConnector1">
+            <a:avLst/>
+          </a:prstGeom>
+          <a:ln w="25400">
+            <a:solidFill>
+              <a:schemeClr val="tx1"/>
+            </a:solidFill>
+            <a:tailEnd type="triangle" w="med" len="lg"/>
+          </a:ln>
+          <a:scene3d>
+            <a:camera prst="orthographicFront">
+              <a:rot lat="0" lon="0" rev="10800000"/>
+            </a:camera>
+            <a:lightRig rig="threePt" dir="t"/>
+          </a:scene3d>
+        </p:spPr>
+        <p:style>
+          <a:lnRef idx="1">
+            <a:schemeClr val="accent1"/>
+          </a:lnRef>
+          <a:fillRef idx="0">
+            <a:schemeClr val="accent1"/>
+          </a:fillRef>
+          <a:effectRef idx="0">
+            <a:schemeClr val="accent1"/>
+          </a:effectRef>
+          <a:fontRef idx="minor">
+            <a:schemeClr val="tx1"/>
+          </a:fontRef>
+        </p:style>
+      </p:cxnSp>
+      <p:sp>
+        <p:nvSpPr>
+          <p:cNvPr id="21" name="TextBox 20"/>
+          <p:cNvSpPr txBox="1"/>
+          <p:nvPr/>
+        </p:nvSpPr>
+        <p:spPr>
+          <a:xfrm>
+            <a:off x="3084444" y="4495800"/>
+            <a:ext cx="2971800" cy="369271"/>
+          </a:xfrm>
+          <a:prstGeom prst="rect">
+            <a:avLst/>
+          </a:prstGeom>
+          <a:solidFill>
+            <a:schemeClr val="bg1"/>
+          </a:solidFill>
+          <a:ln>
+            <a:solidFill>
+              <a:schemeClr val="tx1"/>
+            </a:solidFill>
+          </a:ln>
+        </p:spPr>
+        <p:txBody>
+          <a:bodyPr wrap="square" lIns="91382" tIns="45690" rIns="91382" bIns="45690" rtlCol="0">
+            <a:spAutoFit/>
+          </a:bodyPr>
+          <a:lstStyle/>
+          <a:p>
+            <a:pPr algn="ctr"/>
+            <a:r>
+              <a:rPr lang="en-US" b="1" dirty="0" smtClean="0">
+                <a:latin typeface="Arial" panose="020B0604020202020204" pitchFamily="34" charset="0"/>
+                <a:cs typeface="Arial" panose="020B0604020202020204" pitchFamily="34" charset="0"/>
+              </a:rPr>
+              <a:t>Total </a:t>
+            </a:r>
+            <a:r>
+              <a:rPr lang="en-US" b="1" dirty="0" smtClean="0">
+                <a:latin typeface="Arial" panose="020B0604020202020204" pitchFamily="34" charset="0"/>
+                <a:cs typeface="Arial" panose="020B0604020202020204" pitchFamily="34" charset="0"/>
+              </a:rPr>
+              <a:t>nitrogen, maximum</a:t>
+            </a:r>
+            <a:endParaRPr lang="en-US" b="1" dirty="0">
+              <a:latin typeface="Arial" panose="020B0604020202020204" pitchFamily="34" charset="0"/>
+              <a:cs typeface="Arial" panose="020B0604020202020204" pitchFamily="34" charset="0"/>
+            </a:endParaRPr>
+          </a:p>
+        </p:txBody>
+      </p:sp>
+      <p:cxnSp>
+        <p:nvCxnSpPr>
+          <p:cNvPr id="22" name="Straight Arrow Connector 21"/>
+          <p:cNvCxnSpPr>
+            <a:stCxn id="21" idx="0"/>
+            <a:endCxn id="7" idx="2"/>
+          </p:cNvCxnSpPr>
+          <p:nvPr/>
+        </p:nvCxnSpPr>
+        <p:spPr>
+          <a:xfrm flipV="1">
+            <a:off x="4570344" y="3910964"/>
+            <a:ext cx="1656" cy="584836"/>
+          </a:xfrm>
+          <a:prstGeom prst="straightConnector1">
+            <a:avLst/>
+          </a:prstGeom>
+          <a:ln w="25400">
+            <a:solidFill>
+              <a:schemeClr val="tx1"/>
+            </a:solidFill>
+            <a:tailEnd type="triangle" w="med" len="lg"/>
+          </a:ln>
+        </p:spPr>
+        <p:style>
+          <a:lnRef idx="1">
+            <a:schemeClr val="accent1"/>
+          </a:lnRef>
+          <a:fillRef idx="0">
+            <a:schemeClr val="accent1"/>
+          </a:fillRef>
+          <a:effectRef idx="0">
+            <a:schemeClr val="accent1"/>
+          </a:effectRef>
+          <a:fontRef idx="minor">
+            <a:schemeClr val="tx1"/>
+          </a:fontRef>
+        </p:style>
+      </p:cxnSp>
+    </p:spTree>
+    <p:extLst>
+      <p:ext uri="{BB962C8B-B14F-4D97-AF65-F5344CB8AC3E}">
+        <p14:creationId xmlns:p14="http://schemas.microsoft.com/office/powerpoint/2010/main" val="583984895"/>
+      </p:ext>
+    </p:extLst>
+  </p:cSld>
+  <p:clrMapOvr>
+    <a:masterClrMapping/>
+  </p:clrMapOvr>
+  <p:timing>
+    <p:tnLst>
+      <p:par>
+        <p:cTn id="1" dur="indefinite" restart="never" nodeType="tmRoot"/>
+      </p:par>
+    </p:tnLst>
+  </p:timing>
+</p:sld>
+</file>
+
+<file path=ppt/slides/slide3.xml><?xml version="1.0" encoding="utf-8"?>
 <p:sld xmlns:a="http://schemas.openxmlformats.org/drawingml/2006/main" xmlns:r="http://schemas.openxmlformats.org/officeDocument/2006/relationships" xmlns:p="http://schemas.openxmlformats.org/presentationml/2006/main">
   <p:cSld>
     <p:spTree>

</xml_diff>